<commit_message>
presentation feature selection under work
</commit_message>
<xml_diff>
--- a/Term Project - Group 6.pptx
+++ b/Term Project - Group 6.pptx
@@ -5,7 +5,7 @@
     <p:sldMasterId id="2147483648" r:id="rId1"/>
   </p:sldMasterIdLst>
   <p:notesMasterIdLst>
-    <p:notesMasterId r:id="rId17"/>
+    <p:notesMasterId r:id="rId16"/>
   </p:notesMasterIdLst>
   <p:sldIdLst>
     <p:sldId id="256" r:id="rId2"/>
@@ -19,10 +19,9 @@
     <p:sldId id="264" r:id="rId10"/>
     <p:sldId id="265" r:id="rId11"/>
     <p:sldId id="266" r:id="rId12"/>
-    <p:sldId id="267" r:id="rId13"/>
-    <p:sldId id="268" r:id="rId14"/>
-    <p:sldId id="269" r:id="rId15"/>
-    <p:sldId id="270" r:id="rId16"/>
+    <p:sldId id="268" r:id="rId13"/>
+    <p:sldId id="269" r:id="rId14"/>
+    <p:sldId id="270" r:id="rId15"/>
   </p:sldIdLst>
   <p:sldSz cx="12192000" cy="6858000"/>
   <p:notesSz cx="6858000" cy="9144000"/>
@@ -17557,6 +17556,266 @@
           </a:p>
         </p:txBody>
       </p:sp>
+      <p:sp>
+        <p:nvSpPr>
+          <p:cNvPr id="4" name="Content Placeholder 4">
+            <a:extLst>
+              <a:ext uri="{FF2B5EF4-FFF2-40B4-BE49-F238E27FC236}">
+                <a16:creationId xmlns:a16="http://schemas.microsoft.com/office/drawing/2014/main" id="{E2147FD3-04CA-BC22-EC95-A8E9E5F4CD57}"/>
+              </a:ext>
+            </a:extLst>
+          </p:cNvPr>
+          <p:cNvSpPr txBox="1">
+            <a:spLocks/>
+          </p:cNvSpPr>
+          <p:nvPr/>
+        </p:nvSpPr>
+        <p:spPr>
+          <a:xfrm>
+            <a:off x="838200" y="1825625"/>
+            <a:ext cx="10515600" cy="4351338"/>
+          </a:xfrm>
+          <a:prstGeom prst="rect">
+            <a:avLst/>
+          </a:prstGeom>
+        </p:spPr>
+        <p:txBody>
+          <a:bodyPr/>
+          <a:lstStyle>
+            <a:lvl1pPr marL="228600" indent="-228600" algn="l" defTabSz="914400" rtl="0" eaLnBrk="1" latinLnBrk="0" hangingPunct="1">
+              <a:lnSpc>
+                <a:spcPct val="90000"/>
+              </a:lnSpc>
+              <a:spcBef>
+                <a:spcPts val="1000"/>
+              </a:spcBef>
+              <a:buFont typeface="Arial" panose="020B0604020202020204" pitchFamily="34" charset="0"/>
+              <a:buChar char="•"/>
+              <a:defRPr sz="2800" kern="1200">
+                <a:solidFill>
+                  <a:schemeClr val="tx1"/>
+                </a:solidFill>
+                <a:latin typeface="+mn-lt"/>
+                <a:ea typeface="+mn-ea"/>
+                <a:cs typeface="+mn-cs"/>
+              </a:defRPr>
+            </a:lvl1pPr>
+            <a:lvl2pPr marL="685800" indent="-228600" algn="l" defTabSz="914400" rtl="0" eaLnBrk="1" latinLnBrk="0" hangingPunct="1">
+              <a:lnSpc>
+                <a:spcPct val="90000"/>
+              </a:lnSpc>
+              <a:spcBef>
+                <a:spcPts val="500"/>
+              </a:spcBef>
+              <a:buFont typeface="Arial" panose="020B0604020202020204" pitchFamily="34" charset="0"/>
+              <a:buChar char="•"/>
+              <a:defRPr sz="2400" kern="1200">
+                <a:solidFill>
+                  <a:schemeClr val="tx1"/>
+                </a:solidFill>
+                <a:latin typeface="+mn-lt"/>
+                <a:ea typeface="+mn-ea"/>
+                <a:cs typeface="+mn-cs"/>
+              </a:defRPr>
+            </a:lvl2pPr>
+            <a:lvl3pPr marL="1143000" indent="-228600" algn="l" defTabSz="914400" rtl="0" eaLnBrk="1" latinLnBrk="0" hangingPunct="1">
+              <a:lnSpc>
+                <a:spcPct val="90000"/>
+              </a:lnSpc>
+              <a:spcBef>
+                <a:spcPts val="500"/>
+              </a:spcBef>
+              <a:buFont typeface="Arial" panose="020B0604020202020204" pitchFamily="34" charset="0"/>
+              <a:buChar char="•"/>
+              <a:defRPr sz="2000" kern="1200">
+                <a:solidFill>
+                  <a:schemeClr val="tx1"/>
+                </a:solidFill>
+                <a:latin typeface="+mn-lt"/>
+                <a:ea typeface="+mn-ea"/>
+                <a:cs typeface="+mn-cs"/>
+              </a:defRPr>
+            </a:lvl3pPr>
+            <a:lvl4pPr marL="1600200" indent="-228600" algn="l" defTabSz="914400" rtl="0" eaLnBrk="1" latinLnBrk="0" hangingPunct="1">
+              <a:lnSpc>
+                <a:spcPct val="90000"/>
+              </a:lnSpc>
+              <a:spcBef>
+                <a:spcPts val="500"/>
+              </a:spcBef>
+              <a:buFont typeface="Arial" panose="020B0604020202020204" pitchFamily="34" charset="0"/>
+              <a:buChar char="•"/>
+              <a:defRPr sz="1800" kern="1200">
+                <a:solidFill>
+                  <a:schemeClr val="tx1"/>
+                </a:solidFill>
+                <a:latin typeface="+mn-lt"/>
+                <a:ea typeface="+mn-ea"/>
+                <a:cs typeface="+mn-cs"/>
+              </a:defRPr>
+            </a:lvl4pPr>
+            <a:lvl5pPr marL="2057400" indent="-228600" algn="l" defTabSz="914400" rtl="0" eaLnBrk="1" latinLnBrk="0" hangingPunct="1">
+              <a:lnSpc>
+                <a:spcPct val="90000"/>
+              </a:lnSpc>
+              <a:spcBef>
+                <a:spcPts val="500"/>
+              </a:spcBef>
+              <a:buFont typeface="Arial" panose="020B0604020202020204" pitchFamily="34" charset="0"/>
+              <a:buChar char="•"/>
+              <a:defRPr sz="1800" kern="1200">
+                <a:solidFill>
+                  <a:schemeClr val="tx1"/>
+                </a:solidFill>
+                <a:latin typeface="+mn-lt"/>
+                <a:ea typeface="+mn-ea"/>
+                <a:cs typeface="+mn-cs"/>
+              </a:defRPr>
+            </a:lvl5pPr>
+            <a:lvl6pPr marL="2514600" indent="-228600" algn="l" defTabSz="914400" rtl="0" eaLnBrk="1" latinLnBrk="0" hangingPunct="1">
+              <a:lnSpc>
+                <a:spcPct val="90000"/>
+              </a:lnSpc>
+              <a:spcBef>
+                <a:spcPts val="500"/>
+              </a:spcBef>
+              <a:buFont typeface="Arial" panose="020B0604020202020204" pitchFamily="34" charset="0"/>
+              <a:buChar char="•"/>
+              <a:defRPr sz="1800" kern="1200">
+                <a:solidFill>
+                  <a:schemeClr val="tx1"/>
+                </a:solidFill>
+                <a:latin typeface="+mn-lt"/>
+                <a:ea typeface="+mn-ea"/>
+                <a:cs typeface="+mn-cs"/>
+              </a:defRPr>
+            </a:lvl6pPr>
+            <a:lvl7pPr marL="2971800" indent="-228600" algn="l" defTabSz="914400" rtl="0" eaLnBrk="1" latinLnBrk="0" hangingPunct="1">
+              <a:lnSpc>
+                <a:spcPct val="90000"/>
+              </a:lnSpc>
+              <a:spcBef>
+                <a:spcPts val="500"/>
+              </a:spcBef>
+              <a:buFont typeface="Arial" panose="020B0604020202020204" pitchFamily="34" charset="0"/>
+              <a:buChar char="•"/>
+              <a:defRPr sz="1800" kern="1200">
+                <a:solidFill>
+                  <a:schemeClr val="tx1"/>
+                </a:solidFill>
+                <a:latin typeface="+mn-lt"/>
+                <a:ea typeface="+mn-ea"/>
+                <a:cs typeface="+mn-cs"/>
+              </a:defRPr>
+            </a:lvl7pPr>
+            <a:lvl8pPr marL="3429000" indent="-228600" algn="l" defTabSz="914400" rtl="0" eaLnBrk="1" latinLnBrk="0" hangingPunct="1">
+              <a:lnSpc>
+                <a:spcPct val="90000"/>
+              </a:lnSpc>
+              <a:spcBef>
+                <a:spcPts val="500"/>
+              </a:spcBef>
+              <a:buFont typeface="Arial" panose="020B0604020202020204" pitchFamily="34" charset="0"/>
+              <a:buChar char="•"/>
+              <a:defRPr sz="1800" kern="1200">
+                <a:solidFill>
+                  <a:schemeClr val="tx1"/>
+                </a:solidFill>
+                <a:latin typeface="+mn-lt"/>
+                <a:ea typeface="+mn-ea"/>
+                <a:cs typeface="+mn-cs"/>
+              </a:defRPr>
+            </a:lvl8pPr>
+            <a:lvl9pPr marL="3886200" indent="-228600" algn="l" defTabSz="914400" rtl="0" eaLnBrk="1" latinLnBrk="0" hangingPunct="1">
+              <a:lnSpc>
+                <a:spcPct val="90000"/>
+              </a:lnSpc>
+              <a:spcBef>
+                <a:spcPts val="500"/>
+              </a:spcBef>
+              <a:buFont typeface="Arial" panose="020B0604020202020204" pitchFamily="34" charset="0"/>
+              <a:buChar char="•"/>
+              <a:defRPr sz="1800" kern="1200">
+                <a:solidFill>
+                  <a:schemeClr val="tx1"/>
+                </a:solidFill>
+                <a:latin typeface="+mn-lt"/>
+                <a:ea typeface="+mn-ea"/>
+                <a:cs typeface="+mn-cs"/>
+              </a:defRPr>
+            </a:lvl9pPr>
+          </a:lstStyle>
+          <a:p>
+            <a:r>
+              <a:rPr lang="en-GB"/>
+              <a:t>Features selectors:</a:t>
+            </a:r>
+          </a:p>
+          <a:p>
+            <a:pPr marL="285750" indent="-285750">
+              <a:buFontTx/>
+              <a:buChar char="-"/>
+            </a:pPr>
+            <a:r>
+              <a:rPr lang="en-GB"/>
+              <a:t>Pearson</a:t>
+            </a:r>
+          </a:p>
+          <a:p>
+            <a:pPr marL="285750" indent="-285750">
+              <a:buFontTx/>
+              <a:buChar char="-"/>
+            </a:pPr>
+            <a:r>
+              <a:rPr lang="en-GB"/>
+              <a:t>Chi-Square</a:t>
+            </a:r>
+          </a:p>
+          <a:p>
+            <a:pPr marL="285750" indent="-285750">
+              <a:buFontTx/>
+              <a:buChar char="-"/>
+            </a:pPr>
+            <a:r>
+              <a:rPr lang="en-GB"/>
+              <a:t>Recursive Feature Elimination (RFE)</a:t>
+            </a:r>
+          </a:p>
+          <a:p>
+            <a:pPr marL="285750" indent="-285750">
+              <a:buFontTx/>
+              <a:buChar char="-"/>
+            </a:pPr>
+            <a:r>
+              <a:rPr lang="en-GB"/>
+              <a:t>Logistic Regression (log-reg)</a:t>
+            </a:r>
+          </a:p>
+          <a:p>
+            <a:pPr marL="285750" indent="-285750">
+              <a:buFontTx/>
+              <a:buChar char="-"/>
+            </a:pPr>
+            <a:r>
+              <a:rPr lang="en-GB"/>
+              <a:t>Random Forest (RF)</a:t>
+            </a:r>
+          </a:p>
+          <a:p>
+            <a:pPr marL="285750" indent="-285750">
+              <a:buFontTx/>
+              <a:buChar char="-"/>
+            </a:pPr>
+            <a:r>
+              <a:rPr lang="en-GB"/>
+              <a:t>Light Gradient Boosting Machine (LGBM)</a:t>
+            </a:r>
+          </a:p>
+          <a:p>
+            <a:endParaRPr lang="en-CA" dirty="0"/>
+          </a:p>
+        </p:txBody>
+      </p:sp>
     </p:spTree>
     <p:extLst>
       <p:ext uri="{BB962C8B-B14F-4D97-AF65-F5344CB8AC3E}">
@@ -17646,7 +17905,7 @@
           <a:p>
             <a:r>
               <a:rPr lang="en-GB" dirty="0"/>
-              <a:t>Introduction                II. Data cleaning                   </a:t>
+              <a:t>Introduction                II. Data cleaning                   IV. First models application        </a:t>
             </a:r>
             <a:r>
               <a:rPr lang="en-GB" b="1" dirty="0">
@@ -17654,10 +17913,6 @@
                   <a:srgbClr val="FF0000"/>
                 </a:solidFill>
               </a:rPr>
-              <a:t>IV. First models application        </a:t>
-            </a:r>
-            <a:r>
-              <a:rPr lang="en-GB" dirty="0"/>
               <a:t>VI. Features selection</a:t>
             </a:r>
           </a:p>
@@ -17669,10 +17924,935 @@
           </a:p>
         </p:txBody>
       </p:sp>
+      <p:graphicFrame>
+        <p:nvGraphicFramePr>
+          <p:cNvPr id="4" name="Table 3">
+            <a:extLst>
+              <a:ext uri="{FF2B5EF4-FFF2-40B4-BE49-F238E27FC236}">
+                <a16:creationId xmlns:a16="http://schemas.microsoft.com/office/drawing/2014/main" id="{E844DC8B-CB6C-B4CA-F801-1EAF869E4656}"/>
+              </a:ext>
+            </a:extLst>
+          </p:cNvPr>
+          <p:cNvGraphicFramePr>
+            <a:graphicFrameLocks noGrp="1"/>
+          </p:cNvGraphicFramePr>
+          <p:nvPr>
+            <p:extLst>
+              <p:ext uri="{D42A27DB-BD31-4B8C-83A1-F6EECF244321}">
+                <p14:modId xmlns:p14="http://schemas.microsoft.com/office/powerpoint/2010/main" val="430881773"/>
+              </p:ext>
+            </p:extLst>
+          </p:nvPr>
+        </p:nvGraphicFramePr>
+        <p:xfrm>
+          <a:off x="213360" y="932529"/>
+          <a:ext cx="11765280" cy="2787985"/>
+        </p:xfrm>
+        <a:graphic>
+          <a:graphicData uri="http://schemas.openxmlformats.org/drawingml/2006/table">
+            <a:tbl>
+              <a:tblPr firstRow="1" bandRow="1">
+                <a:tableStyleId>{5C22544A-7EE6-4342-B048-85BDC9FD1C3A}</a:tableStyleId>
+              </a:tblPr>
+              <a:tblGrid>
+                <a:gridCol w="1610886">
+                  <a:extLst>
+                    <a:ext uri="{9D8B030D-6E8A-4147-A177-3AD203B41FA5}">
+                      <a16:colId xmlns:a16="http://schemas.microsoft.com/office/drawing/2014/main" val="3618850738"/>
+                    </a:ext>
+                  </a:extLst>
+                </a:gridCol>
+                <a:gridCol w="1692399">
+                  <a:extLst>
+                    <a:ext uri="{9D8B030D-6E8A-4147-A177-3AD203B41FA5}">
+                      <a16:colId xmlns:a16="http://schemas.microsoft.com/office/drawing/2014/main" val="3733970893"/>
+                    </a:ext>
+                  </a:extLst>
+                </a:gridCol>
+                <a:gridCol w="1692399">
+                  <a:extLst>
+                    <a:ext uri="{9D8B030D-6E8A-4147-A177-3AD203B41FA5}">
+                      <a16:colId xmlns:a16="http://schemas.microsoft.com/office/drawing/2014/main" val="4012850141"/>
+                    </a:ext>
+                  </a:extLst>
+                </a:gridCol>
+                <a:gridCol w="1692399">
+                  <a:extLst>
+                    <a:ext uri="{9D8B030D-6E8A-4147-A177-3AD203B41FA5}">
+                      <a16:colId xmlns:a16="http://schemas.microsoft.com/office/drawing/2014/main" val="1934419761"/>
+                    </a:ext>
+                  </a:extLst>
+                </a:gridCol>
+                <a:gridCol w="1692399">
+                  <a:extLst>
+                    <a:ext uri="{9D8B030D-6E8A-4147-A177-3AD203B41FA5}">
+                      <a16:colId xmlns:a16="http://schemas.microsoft.com/office/drawing/2014/main" val="1106848482"/>
+                    </a:ext>
+                  </a:extLst>
+                </a:gridCol>
+                <a:gridCol w="1692399">
+                  <a:extLst>
+                    <a:ext uri="{9D8B030D-6E8A-4147-A177-3AD203B41FA5}">
+                      <a16:colId xmlns:a16="http://schemas.microsoft.com/office/drawing/2014/main" val="2143244866"/>
+                    </a:ext>
+                  </a:extLst>
+                </a:gridCol>
+                <a:gridCol w="1692399">
+                  <a:extLst>
+                    <a:ext uri="{9D8B030D-6E8A-4147-A177-3AD203B41FA5}">
+                      <a16:colId xmlns:a16="http://schemas.microsoft.com/office/drawing/2014/main" val="2667388974"/>
+                    </a:ext>
+                  </a:extLst>
+                </a:gridCol>
+              </a:tblGrid>
+              <a:tr h="715450">
+                <a:tc>
+                  <a:txBody>
+                    <a:bodyPr/>
+                    <a:lstStyle/>
+                    <a:p>
+                      <a:endParaRPr lang="en-GB" b="1" dirty="0"/>
+                    </a:p>
+                  </a:txBody>
+                  <a:tcPr/>
+                </a:tc>
+                <a:tc>
+                  <a:txBody>
+                    <a:bodyPr/>
+                    <a:lstStyle/>
+                    <a:p>
+                      <a:pPr marL="0" marR="0" lvl="0" indent="0" algn="l" defTabSz="914400" rtl="0" eaLnBrk="1" fontAlgn="auto" latinLnBrk="0" hangingPunct="1">
+                        <a:lnSpc>
+                          <a:spcPct val="100000"/>
+                        </a:lnSpc>
+                        <a:spcBef>
+                          <a:spcPts val="0"/>
+                        </a:spcBef>
+                        <a:spcAft>
+                          <a:spcPts val="0"/>
+                        </a:spcAft>
+                        <a:buClrTx/>
+                        <a:buSzTx/>
+                        <a:buFontTx/>
+                        <a:buNone/>
+                        <a:tabLst/>
+                        <a:defRPr/>
+                      </a:pPr>
+                      <a:r>
+                        <a:rPr lang="en-GB" dirty="0"/>
+                        <a:t>Default</a:t>
+                      </a:r>
+                    </a:p>
+                  </a:txBody>
+                  <a:tcPr/>
+                </a:tc>
+                <a:tc>
+                  <a:txBody>
+                    <a:bodyPr/>
+                    <a:lstStyle/>
+                    <a:p>
+                      <a:r>
+                        <a:rPr lang="en-GB"/>
+                        <a:t>Grid search</a:t>
+                      </a:r>
+                      <a:endParaRPr lang="en-GB" dirty="0"/>
+                    </a:p>
+                  </a:txBody>
+                  <a:tcPr/>
+                </a:tc>
+                <a:tc>
+                  <a:txBody>
+                    <a:bodyPr/>
+                    <a:lstStyle/>
+                    <a:p>
+                      <a:r>
+                        <a:rPr lang="en-GB"/>
+                        <a:t>No sex</a:t>
+                      </a:r>
+                      <a:endParaRPr lang="en-GB" dirty="0"/>
+                    </a:p>
+                  </a:txBody>
+                  <a:tcPr/>
+                </a:tc>
+                <a:tc>
+                  <a:txBody>
+                    <a:bodyPr/>
+                    <a:lstStyle/>
+                    <a:p>
+                      <a:r>
+                        <a:rPr lang="en-GB" dirty="0"/>
+                        <a:t>No (sex – </a:t>
+                      </a:r>
+                      <a:r>
+                        <a:rPr lang="en-GB" dirty="0" err="1"/>
+                        <a:t>ggt</a:t>
+                      </a:r>
+                      <a:r>
+                        <a:rPr lang="en-GB" dirty="0"/>
+                        <a:t>)</a:t>
+                      </a:r>
+                    </a:p>
+                  </a:txBody>
+                  <a:tcPr/>
+                </a:tc>
+                <a:tc>
+                  <a:txBody>
+                    <a:bodyPr/>
+                    <a:lstStyle/>
+                    <a:p>
+                      <a:pPr marL="0" marR="0" lvl="0" indent="0" algn="l" defTabSz="914400" rtl="0" eaLnBrk="1" fontAlgn="auto" latinLnBrk="0" hangingPunct="1">
+                        <a:lnSpc>
+                          <a:spcPct val="100000"/>
+                        </a:lnSpc>
+                        <a:spcBef>
+                          <a:spcPts val="0"/>
+                        </a:spcBef>
+                        <a:spcAft>
+                          <a:spcPts val="0"/>
+                        </a:spcAft>
+                        <a:buClrTx/>
+                        <a:buSzTx/>
+                        <a:buFontTx/>
+                        <a:buNone/>
+                        <a:tabLst/>
+                        <a:defRPr/>
+                      </a:pPr>
+                      <a:r>
+                        <a:rPr lang="en-GB"/>
+                        <a:t>No (sex – ggt – chol)</a:t>
+                      </a:r>
+                      <a:endParaRPr lang="en-GB" dirty="0"/>
+                    </a:p>
+                  </a:txBody>
+                  <a:tcPr/>
+                </a:tc>
+                <a:tc>
+                  <a:txBody>
+                    <a:bodyPr/>
+                    <a:lstStyle/>
+                    <a:p>
+                      <a:pPr marL="0" marR="0" lvl="0" indent="0" algn="l" defTabSz="914400" rtl="0" eaLnBrk="1" fontAlgn="auto" latinLnBrk="0" hangingPunct="1">
+                        <a:lnSpc>
+                          <a:spcPct val="100000"/>
+                        </a:lnSpc>
+                        <a:spcBef>
+                          <a:spcPts val="0"/>
+                        </a:spcBef>
+                        <a:spcAft>
+                          <a:spcPts val="0"/>
+                        </a:spcAft>
+                        <a:buClrTx/>
+                        <a:buSzTx/>
+                        <a:buFontTx/>
+                        <a:buNone/>
+                        <a:tabLst/>
+                        <a:defRPr/>
+                      </a:pPr>
+                      <a:r>
+                        <a:rPr lang="en-GB"/>
+                        <a:t>No (sex – ggt – chol - bil)</a:t>
+                      </a:r>
+                      <a:endParaRPr lang="en-GB" dirty="0"/>
+                    </a:p>
+                  </a:txBody>
+                  <a:tcPr/>
+                </a:tc>
+                <a:extLst>
+                  <a:ext uri="{0D108BD9-81ED-4DB2-BD59-A6C34878D82A}">
+                    <a16:rowId xmlns:a16="http://schemas.microsoft.com/office/drawing/2014/main" val="3925612283"/>
+                  </a:ext>
+                </a:extLst>
+              </a:tr>
+              <a:tr h="414507">
+                <a:tc>
+                  <a:txBody>
+                    <a:bodyPr/>
+                    <a:lstStyle/>
+                    <a:p>
+                      <a:r>
+                        <a:rPr lang="en-GB" b="1"/>
+                        <a:t>LRM</a:t>
+                      </a:r>
+                      <a:endParaRPr lang="en-GB" b="1" dirty="0"/>
+                    </a:p>
+                  </a:txBody>
+                  <a:tcPr/>
+                </a:tc>
+                <a:tc>
+                  <a:txBody>
+                    <a:bodyPr/>
+                    <a:lstStyle/>
+                    <a:p>
+                      <a:r>
+                        <a:rPr lang="en-GB" dirty="0"/>
+                        <a:t>89.43</a:t>
+                      </a:r>
+                    </a:p>
+                  </a:txBody>
+                  <a:tcPr/>
+                </a:tc>
+                <a:tc>
+                  <a:txBody>
+                    <a:bodyPr/>
+                    <a:lstStyle/>
+                    <a:p>
+                      <a:r>
+                        <a:rPr lang="en-GB" dirty="0"/>
+                        <a:t>89.43</a:t>
+                      </a:r>
+                    </a:p>
+                  </a:txBody>
+                  <a:tcPr/>
+                </a:tc>
+                <a:tc>
+                  <a:txBody>
+                    <a:bodyPr/>
+                    <a:lstStyle/>
+                    <a:p>
+                      <a:r>
+                        <a:rPr lang="en-GB"/>
+                        <a:t>88.61</a:t>
+                      </a:r>
+                      <a:endParaRPr lang="en-GB" dirty="0"/>
+                    </a:p>
+                  </a:txBody>
+                  <a:tcPr/>
+                </a:tc>
+                <a:tc>
+                  <a:txBody>
+                    <a:bodyPr/>
+                    <a:lstStyle/>
+                    <a:p>
+                      <a:r>
+                        <a:rPr lang="en-GB" dirty="0"/>
+                        <a:t>89.46</a:t>
+                      </a:r>
+                    </a:p>
+                  </a:txBody>
+                  <a:tcPr>
+                    <a:solidFill>
+                      <a:schemeClr val="accent6"/>
+                    </a:solidFill>
+                  </a:tcPr>
+                </a:tc>
+                <a:tc>
+                  <a:txBody>
+                    <a:bodyPr/>
+                    <a:lstStyle/>
+                    <a:p>
+                      <a:r>
+                        <a:rPr lang="en-GB"/>
+                        <a:t>85.37</a:t>
+                      </a:r>
+                      <a:endParaRPr lang="en-GB" dirty="0"/>
+                    </a:p>
+                  </a:txBody>
+                  <a:tcPr/>
+                </a:tc>
+                <a:tc>
+                  <a:txBody>
+                    <a:bodyPr/>
+                    <a:lstStyle/>
+                    <a:p>
+                      <a:r>
+                        <a:rPr lang="en-GB"/>
+                        <a:t>86.99</a:t>
+                      </a:r>
+                      <a:endParaRPr lang="en-GB" dirty="0"/>
+                    </a:p>
+                  </a:txBody>
+                  <a:tcPr/>
+                </a:tc>
+                <a:extLst>
+                  <a:ext uri="{0D108BD9-81ED-4DB2-BD59-A6C34878D82A}">
+                    <a16:rowId xmlns:a16="http://schemas.microsoft.com/office/drawing/2014/main" val="4031799908"/>
+                  </a:ext>
+                </a:extLst>
+              </a:tr>
+              <a:tr h="414507">
+                <a:tc>
+                  <a:txBody>
+                    <a:bodyPr/>
+                    <a:lstStyle/>
+                    <a:p>
+                      <a:r>
+                        <a:rPr lang="en-GB" b="1"/>
+                        <a:t>DTM</a:t>
+                      </a:r>
+                      <a:endParaRPr lang="en-GB" b="1" dirty="0"/>
+                    </a:p>
+                  </a:txBody>
+                  <a:tcPr/>
+                </a:tc>
+                <a:tc>
+                  <a:txBody>
+                    <a:bodyPr/>
+                    <a:lstStyle/>
+                    <a:p>
+                      <a:r>
+                        <a:rPr lang="en-GB" dirty="0"/>
+                        <a:t>87.80</a:t>
+                      </a:r>
+                    </a:p>
+                  </a:txBody>
+                  <a:tcPr/>
+                </a:tc>
+                <a:tc>
+                  <a:txBody>
+                    <a:bodyPr/>
+                    <a:lstStyle/>
+                    <a:p>
+                      <a:r>
+                        <a:rPr lang="en-GB" dirty="0"/>
+                        <a:t>87.80</a:t>
+                      </a:r>
+                    </a:p>
+                  </a:txBody>
+                  <a:tcPr>
+                    <a:solidFill>
+                      <a:schemeClr val="accent6"/>
+                    </a:solidFill>
+                  </a:tcPr>
+                </a:tc>
+                <a:tc>
+                  <a:txBody>
+                    <a:bodyPr/>
+                    <a:lstStyle/>
+                    <a:p>
+                      <a:r>
+                        <a:rPr lang="en-GB"/>
+                        <a:t>85.37</a:t>
+                      </a:r>
+                      <a:endParaRPr lang="en-GB" dirty="0"/>
+                    </a:p>
+                  </a:txBody>
+                  <a:tcPr/>
+                </a:tc>
+                <a:tc>
+                  <a:txBody>
+                    <a:bodyPr/>
+                    <a:lstStyle/>
+                    <a:p>
+                      <a:r>
+                        <a:rPr lang="en-GB" dirty="0"/>
+                        <a:t>81.30</a:t>
+                      </a:r>
+                    </a:p>
+                  </a:txBody>
+                  <a:tcPr/>
+                </a:tc>
+                <a:tc>
+                  <a:txBody>
+                    <a:bodyPr/>
+                    <a:lstStyle/>
+                    <a:p>
+                      <a:r>
+                        <a:rPr lang="en-GB"/>
+                        <a:t>82.11</a:t>
+                      </a:r>
+                      <a:endParaRPr lang="en-GB" dirty="0"/>
+                    </a:p>
+                  </a:txBody>
+                  <a:tcPr/>
+                </a:tc>
+                <a:tc>
+                  <a:txBody>
+                    <a:bodyPr/>
+                    <a:lstStyle/>
+                    <a:p>
+                      <a:r>
+                        <a:rPr lang="en-GB"/>
+                        <a:t>82.11</a:t>
+                      </a:r>
+                      <a:endParaRPr lang="en-GB" dirty="0"/>
+                    </a:p>
+                  </a:txBody>
+                  <a:tcPr/>
+                </a:tc>
+                <a:extLst>
+                  <a:ext uri="{0D108BD9-81ED-4DB2-BD59-A6C34878D82A}">
+                    <a16:rowId xmlns:a16="http://schemas.microsoft.com/office/drawing/2014/main" val="2928084628"/>
+                  </a:ext>
+                </a:extLst>
+              </a:tr>
+              <a:tr h="414507">
+                <a:tc>
+                  <a:txBody>
+                    <a:bodyPr/>
+                    <a:lstStyle/>
+                    <a:p>
+                      <a:r>
+                        <a:rPr lang="en-GB" b="1"/>
+                        <a:t>RFM</a:t>
+                      </a:r>
+                      <a:endParaRPr lang="en-GB" b="1" dirty="0"/>
+                    </a:p>
+                  </a:txBody>
+                  <a:tcPr/>
+                </a:tc>
+                <a:tc>
+                  <a:txBody>
+                    <a:bodyPr/>
+                    <a:lstStyle/>
+                    <a:p>
+                      <a:r>
+                        <a:rPr lang="en-GB"/>
+                        <a:t>86.18</a:t>
+                      </a:r>
+                      <a:endParaRPr lang="en-GB" dirty="0"/>
+                    </a:p>
+                  </a:txBody>
+                  <a:tcPr/>
+                </a:tc>
+                <a:tc>
+                  <a:txBody>
+                    <a:bodyPr/>
+                    <a:lstStyle/>
+                    <a:p>
+                      <a:r>
+                        <a:rPr lang="en-GB" dirty="0"/>
+                        <a:t>85.37</a:t>
+                      </a:r>
+                    </a:p>
+                  </a:txBody>
+                  <a:tcPr/>
+                </a:tc>
+                <a:tc>
+                  <a:txBody>
+                    <a:bodyPr/>
+                    <a:lstStyle/>
+                    <a:p>
+                      <a:r>
+                        <a:rPr lang="en-GB"/>
+                        <a:t>85.37</a:t>
+                      </a:r>
+                      <a:endParaRPr lang="en-GB" dirty="0"/>
+                    </a:p>
+                  </a:txBody>
+                  <a:tcPr/>
+                </a:tc>
+                <a:tc>
+                  <a:txBody>
+                    <a:bodyPr/>
+                    <a:lstStyle/>
+                    <a:p>
+                      <a:r>
+                        <a:rPr lang="en-GB"/>
+                        <a:t>86.18</a:t>
+                      </a:r>
+                      <a:endParaRPr lang="en-GB" dirty="0"/>
+                    </a:p>
+                  </a:txBody>
+                  <a:tcPr/>
+                </a:tc>
+                <a:tc>
+                  <a:txBody>
+                    <a:bodyPr/>
+                    <a:lstStyle/>
+                    <a:p>
+                      <a:r>
+                        <a:rPr lang="en-GB" dirty="0"/>
+                        <a:t>86.99</a:t>
+                      </a:r>
+                    </a:p>
+                  </a:txBody>
+                  <a:tcPr>
+                    <a:solidFill>
+                      <a:schemeClr val="accent6"/>
+                    </a:solidFill>
+                  </a:tcPr>
+                </a:tc>
+                <a:tc>
+                  <a:txBody>
+                    <a:bodyPr/>
+                    <a:lstStyle/>
+                    <a:p>
+                      <a:r>
+                        <a:rPr lang="en-GB"/>
+                        <a:t>86.18</a:t>
+                      </a:r>
+                      <a:endParaRPr lang="en-GB" dirty="0"/>
+                    </a:p>
+                  </a:txBody>
+                  <a:tcPr/>
+                </a:tc>
+                <a:extLst>
+                  <a:ext uri="{0D108BD9-81ED-4DB2-BD59-A6C34878D82A}">
+                    <a16:rowId xmlns:a16="http://schemas.microsoft.com/office/drawing/2014/main" val="258477745"/>
+                  </a:ext>
+                </a:extLst>
+              </a:tr>
+              <a:tr h="414507">
+                <a:tc>
+                  <a:txBody>
+                    <a:bodyPr/>
+                    <a:lstStyle/>
+                    <a:p>
+                      <a:r>
+                        <a:rPr lang="en-GB" b="1"/>
+                        <a:t>SGDM</a:t>
+                      </a:r>
+                      <a:endParaRPr lang="en-GB" b="1" dirty="0"/>
+                    </a:p>
+                  </a:txBody>
+                  <a:tcPr/>
+                </a:tc>
+                <a:tc>
+                  <a:txBody>
+                    <a:bodyPr/>
+                    <a:lstStyle/>
+                    <a:p>
+                      <a:r>
+                        <a:rPr lang="en-GB"/>
+                        <a:t>86.99</a:t>
+                      </a:r>
+                      <a:endParaRPr lang="en-GB" dirty="0"/>
+                    </a:p>
+                  </a:txBody>
+                  <a:tcPr/>
+                </a:tc>
+                <a:tc>
+                  <a:txBody>
+                    <a:bodyPr/>
+                    <a:lstStyle/>
+                    <a:p>
+                      <a:r>
+                        <a:rPr lang="en-GB" dirty="0"/>
+                        <a:t>87.80</a:t>
+                      </a:r>
+                    </a:p>
+                  </a:txBody>
+                  <a:tcPr/>
+                </a:tc>
+                <a:tc>
+                  <a:txBody>
+                    <a:bodyPr/>
+                    <a:lstStyle/>
+                    <a:p>
+                      <a:r>
+                        <a:rPr lang="en-GB" dirty="0"/>
+                        <a:t>89.43</a:t>
+                      </a:r>
+                    </a:p>
+                  </a:txBody>
+                  <a:tcPr>
+                    <a:solidFill>
+                      <a:schemeClr val="accent6"/>
+                    </a:solidFill>
+                  </a:tcPr>
+                </a:tc>
+                <a:tc>
+                  <a:txBody>
+                    <a:bodyPr/>
+                    <a:lstStyle/>
+                    <a:p>
+                      <a:r>
+                        <a:rPr lang="en-GB"/>
+                        <a:t>83.74</a:t>
+                      </a:r>
+                      <a:endParaRPr lang="en-GB" dirty="0"/>
+                    </a:p>
+                  </a:txBody>
+                  <a:tcPr/>
+                </a:tc>
+                <a:tc>
+                  <a:txBody>
+                    <a:bodyPr/>
+                    <a:lstStyle/>
+                    <a:p>
+                      <a:r>
+                        <a:rPr lang="en-GB"/>
+                        <a:t>83.74</a:t>
+                      </a:r>
+                      <a:endParaRPr lang="en-GB" dirty="0"/>
+                    </a:p>
+                  </a:txBody>
+                  <a:tcPr/>
+                </a:tc>
+                <a:tc>
+                  <a:txBody>
+                    <a:bodyPr/>
+                    <a:lstStyle/>
+                    <a:p>
+                      <a:r>
+                        <a:rPr lang="en-GB"/>
+                        <a:t>83.74</a:t>
+                      </a:r>
+                      <a:endParaRPr lang="en-GB" dirty="0"/>
+                    </a:p>
+                  </a:txBody>
+                  <a:tcPr/>
+                </a:tc>
+                <a:extLst>
+                  <a:ext uri="{0D108BD9-81ED-4DB2-BD59-A6C34878D82A}">
+                    <a16:rowId xmlns:a16="http://schemas.microsoft.com/office/drawing/2014/main" val="2066739902"/>
+                  </a:ext>
+                </a:extLst>
+              </a:tr>
+              <a:tr h="414507">
+                <a:tc>
+                  <a:txBody>
+                    <a:bodyPr/>
+                    <a:lstStyle/>
+                    <a:p>
+                      <a:r>
+                        <a:rPr lang="en-GB" b="1"/>
+                        <a:t>SVMM</a:t>
+                      </a:r>
+                      <a:endParaRPr lang="en-GB" b="1" dirty="0"/>
+                    </a:p>
+                  </a:txBody>
+                  <a:tcPr/>
+                </a:tc>
+                <a:tc>
+                  <a:txBody>
+                    <a:bodyPr/>
+                    <a:lstStyle/>
+                    <a:p>
+                      <a:r>
+                        <a:rPr lang="en-GB"/>
+                        <a:t>86.99</a:t>
+                      </a:r>
+                      <a:endParaRPr lang="en-GB" dirty="0"/>
+                    </a:p>
+                  </a:txBody>
+                  <a:tcPr/>
+                </a:tc>
+                <a:tc>
+                  <a:txBody>
+                    <a:bodyPr/>
+                    <a:lstStyle/>
+                    <a:p>
+                      <a:r>
+                        <a:rPr lang="en-GB" dirty="0"/>
+                        <a:t>86.99</a:t>
+                      </a:r>
+                    </a:p>
+                  </a:txBody>
+                  <a:tcPr/>
+                </a:tc>
+                <a:tc>
+                  <a:txBody>
+                    <a:bodyPr/>
+                    <a:lstStyle/>
+                    <a:p>
+                      <a:r>
+                        <a:rPr lang="en-GB" dirty="0"/>
+                        <a:t>89.43</a:t>
+                      </a:r>
+                    </a:p>
+                  </a:txBody>
+                  <a:tcPr>
+                    <a:solidFill>
+                      <a:schemeClr val="accent6"/>
+                    </a:solidFill>
+                  </a:tcPr>
+                </a:tc>
+                <a:tc>
+                  <a:txBody>
+                    <a:bodyPr/>
+                    <a:lstStyle/>
+                    <a:p>
+                      <a:r>
+                        <a:rPr lang="en-GB"/>
+                        <a:t>83.74</a:t>
+                      </a:r>
+                      <a:endParaRPr lang="en-GB" dirty="0"/>
+                    </a:p>
+                  </a:txBody>
+                  <a:tcPr/>
+                </a:tc>
+                <a:tc>
+                  <a:txBody>
+                    <a:bodyPr/>
+                    <a:lstStyle/>
+                    <a:p>
+                      <a:r>
+                        <a:rPr lang="en-GB"/>
+                        <a:t>88.62</a:t>
+                      </a:r>
+                      <a:endParaRPr lang="en-GB" dirty="0"/>
+                    </a:p>
+                  </a:txBody>
+                  <a:tcPr/>
+                </a:tc>
+                <a:tc>
+                  <a:txBody>
+                    <a:bodyPr/>
+                    <a:lstStyle/>
+                    <a:p>
+                      <a:r>
+                        <a:rPr lang="en-GB" dirty="0"/>
+                        <a:t>85.37</a:t>
+                      </a:r>
+                    </a:p>
+                  </a:txBody>
+                  <a:tcPr/>
+                </a:tc>
+                <a:extLst>
+                  <a:ext uri="{0D108BD9-81ED-4DB2-BD59-A6C34878D82A}">
+                    <a16:rowId xmlns:a16="http://schemas.microsoft.com/office/drawing/2014/main" val="1526620503"/>
+                  </a:ext>
+                </a:extLst>
+              </a:tr>
+            </a:tbl>
+          </a:graphicData>
+        </a:graphic>
+      </p:graphicFrame>
+      <p:pic>
+        <p:nvPicPr>
+          <p:cNvPr id="6" name="Picture 5">
+            <a:extLst>
+              <a:ext uri="{FF2B5EF4-FFF2-40B4-BE49-F238E27FC236}">
+                <a16:creationId xmlns:a16="http://schemas.microsoft.com/office/drawing/2014/main" id="{D5DAE0FB-1560-AC6F-DB75-9EB533897A76}"/>
+              </a:ext>
+            </a:extLst>
+          </p:cNvPr>
+          <p:cNvPicPr>
+            <a:picLocks noChangeAspect="1"/>
+          </p:cNvPicPr>
+          <p:nvPr/>
+        </p:nvPicPr>
+        <p:blipFill>
+          <a:blip r:embed="rId2"/>
+          <a:stretch>
+            <a:fillRect/>
+          </a:stretch>
+        </p:blipFill>
+        <p:spPr>
+          <a:xfrm>
+            <a:off x="213360" y="3837030"/>
+            <a:ext cx="2093447" cy="1931925"/>
+          </a:xfrm>
+          <a:prstGeom prst="rect">
+            <a:avLst/>
+          </a:prstGeom>
+        </p:spPr>
+      </p:pic>
+      <p:pic>
+        <p:nvPicPr>
+          <p:cNvPr id="8" name="Picture 7">
+            <a:extLst>
+              <a:ext uri="{FF2B5EF4-FFF2-40B4-BE49-F238E27FC236}">
+                <a16:creationId xmlns:a16="http://schemas.microsoft.com/office/drawing/2014/main" id="{40C08076-3CAD-C981-880F-03BEE458B60A}"/>
+              </a:ext>
+            </a:extLst>
+          </p:cNvPr>
+          <p:cNvPicPr>
+            <a:picLocks noChangeAspect="1"/>
+          </p:cNvPicPr>
+          <p:nvPr/>
+        </p:nvPicPr>
+        <p:blipFill>
+          <a:blip r:embed="rId3"/>
+          <a:stretch>
+            <a:fillRect/>
+          </a:stretch>
+        </p:blipFill>
+        <p:spPr>
+          <a:xfrm>
+            <a:off x="2624864" y="3837030"/>
+            <a:ext cx="2093447" cy="1931925"/>
+          </a:xfrm>
+          <a:prstGeom prst="rect">
+            <a:avLst/>
+          </a:prstGeom>
+        </p:spPr>
+      </p:pic>
+      <p:pic>
+        <p:nvPicPr>
+          <p:cNvPr id="13" name="Picture 12">
+            <a:extLst>
+              <a:ext uri="{FF2B5EF4-FFF2-40B4-BE49-F238E27FC236}">
+                <a16:creationId xmlns:a16="http://schemas.microsoft.com/office/drawing/2014/main" id="{552E4E61-4DB8-4D98-14E7-C89A0D5894D1}"/>
+              </a:ext>
+            </a:extLst>
+          </p:cNvPr>
+          <p:cNvPicPr>
+            <a:picLocks noChangeAspect="1"/>
+          </p:cNvPicPr>
+          <p:nvPr/>
+        </p:nvPicPr>
+        <p:blipFill>
+          <a:blip r:embed="rId4"/>
+          <a:stretch>
+            <a:fillRect/>
+          </a:stretch>
+        </p:blipFill>
+        <p:spPr>
+          <a:xfrm>
+            <a:off x="5036368" y="3837031"/>
+            <a:ext cx="2093447" cy="1931926"/>
+          </a:xfrm>
+          <a:prstGeom prst="rect">
+            <a:avLst/>
+          </a:prstGeom>
+        </p:spPr>
+      </p:pic>
+      <p:pic>
+        <p:nvPicPr>
+          <p:cNvPr id="15" name="Picture 14">
+            <a:extLst>
+              <a:ext uri="{FF2B5EF4-FFF2-40B4-BE49-F238E27FC236}">
+                <a16:creationId xmlns:a16="http://schemas.microsoft.com/office/drawing/2014/main" id="{C84E8C06-8063-C2AE-068B-1EF9E5EFF707}"/>
+              </a:ext>
+            </a:extLst>
+          </p:cNvPr>
+          <p:cNvPicPr>
+            <a:picLocks noChangeAspect="1"/>
+          </p:cNvPicPr>
+          <p:nvPr/>
+        </p:nvPicPr>
+        <p:blipFill>
+          <a:blip r:embed="rId5"/>
+          <a:stretch>
+            <a:fillRect/>
+          </a:stretch>
+        </p:blipFill>
+        <p:spPr>
+          <a:xfrm>
+            <a:off x="7447872" y="3837030"/>
+            <a:ext cx="2093447" cy="1931925"/>
+          </a:xfrm>
+          <a:prstGeom prst="rect">
+            <a:avLst/>
+          </a:prstGeom>
+        </p:spPr>
+      </p:pic>
+      <p:pic>
+        <p:nvPicPr>
+          <p:cNvPr id="17" name="Picture 16">
+            <a:extLst>
+              <a:ext uri="{FF2B5EF4-FFF2-40B4-BE49-F238E27FC236}">
+                <a16:creationId xmlns:a16="http://schemas.microsoft.com/office/drawing/2014/main" id="{A95D7E9F-3C5F-A051-058B-5CD4E6C0836A}"/>
+              </a:ext>
+            </a:extLst>
+          </p:cNvPr>
+          <p:cNvPicPr>
+            <a:picLocks noChangeAspect="1"/>
+          </p:cNvPicPr>
+          <p:nvPr/>
+        </p:nvPicPr>
+        <p:blipFill>
+          <a:blip r:embed="rId6"/>
+          <a:stretch>
+            <a:fillRect/>
+          </a:stretch>
+        </p:blipFill>
+        <p:spPr>
+          <a:xfrm>
+            <a:off x="9859376" y="3889678"/>
+            <a:ext cx="2036396" cy="1879277"/>
+          </a:xfrm>
+          <a:prstGeom prst="rect">
+            <a:avLst/>
+          </a:prstGeom>
+        </p:spPr>
+      </p:pic>
     </p:spTree>
     <p:extLst>
       <p:ext uri="{BB962C8B-B14F-4D97-AF65-F5344CB8AC3E}">
-        <p14:creationId xmlns:p14="http://schemas.microsoft.com/office/powerpoint/2010/main" val="2275526234"/>
+        <p14:creationId xmlns:p14="http://schemas.microsoft.com/office/powerpoint/2010/main" val="652959621"/>
       </p:ext>
     </p:extLst>
   </p:cSld>
@@ -17758,7 +18938,13 @@
           <a:p>
             <a:r>
               <a:rPr lang="en-GB" dirty="0"/>
-              <a:t>Introduction                II. Data cleaning                   IV. First models application        </a:t>
+              <a:t>Introduction                II. Data cleaning                   IV. First models application        VI. Features selection</a:t>
+            </a:r>
+          </a:p>
+          <a:p>
+            <a:r>
+              <a:rPr lang="en-GB" dirty="0"/>
+              <a:t>I. Data description     III. Data preprocessing        V. Grid search application          </a:t>
             </a:r>
             <a:r>
               <a:rPr lang="en-GB" b="1" dirty="0">
@@ -17766,13 +18952,7 @@
                   <a:srgbClr val="FF0000"/>
                 </a:solidFill>
               </a:rPr>
-              <a:t>VI. Features selection</a:t>
-            </a:r>
-          </a:p>
-          <a:p>
-            <a:r>
-              <a:rPr lang="en-GB" dirty="0"/>
-              <a:t>I. Data description     III. Data preprocessing        V. Grid search application          Conclusion</a:t>
+              <a:t>Conclusion</a:t>
             </a:r>
           </a:p>
         </p:txBody>
@@ -17780,7 +18960,7 @@
     </p:spTree>
     <p:extLst>
       <p:ext uri="{BB962C8B-B14F-4D97-AF65-F5344CB8AC3E}">
-        <p14:creationId xmlns:p14="http://schemas.microsoft.com/office/powerpoint/2010/main" val="652959621"/>
+        <p14:creationId xmlns:p14="http://schemas.microsoft.com/office/powerpoint/2010/main" val="411328488"/>
       </p:ext>
     </p:extLst>
   </p:cSld>
@@ -17875,7 +19055,7 @@
               <a:t>I. Data description     III. Data preprocessing        V. Grid search application          </a:t>
             </a:r>
             <a:r>
-              <a:rPr lang="en-GB" b="1" dirty="0">
+              <a:rPr lang="en-GB" dirty="0">
                 <a:solidFill>
                   <a:srgbClr val="FF0000"/>
                 </a:solidFill>
@@ -17885,71 +19065,12 @@
           </a:p>
         </p:txBody>
       </p:sp>
-    </p:spTree>
-    <p:extLst>
-      <p:ext uri="{BB962C8B-B14F-4D97-AF65-F5344CB8AC3E}">
-        <p14:creationId xmlns:p14="http://schemas.microsoft.com/office/powerpoint/2010/main" val="411328488"/>
-      </p:ext>
-    </p:extLst>
-  </p:cSld>
-  <p:clrMapOvr>
-    <a:masterClrMapping/>
-  </p:clrMapOvr>
-</p:sld>
-</file>
-
-<file path=ppt/slides/slide15.xml><?xml version="1.0" encoding="utf-8"?>
-<p:sld xmlns:a="http://schemas.openxmlformats.org/drawingml/2006/main" xmlns:r="http://schemas.openxmlformats.org/officeDocument/2006/relationships" xmlns:p="http://schemas.openxmlformats.org/presentationml/2006/main">
-  <p:cSld>
-    <p:spTree>
-      <p:nvGrpSpPr>
-        <p:cNvPr id="1" name=""/>
-        <p:cNvGrpSpPr/>
-        <p:nvPr/>
-      </p:nvGrpSpPr>
-      <p:grpSpPr>
-        <a:xfrm>
-          <a:off x="0" y="0"/>
-          <a:ext cx="0" cy="0"/>
-          <a:chOff x="0" y="0"/>
-          <a:chExt cx="0" cy="0"/>
-        </a:xfrm>
-      </p:grpSpPr>
       <p:sp>
         <p:nvSpPr>
-          <p:cNvPr id="3" name="Slide Number Placeholder 2">
+          <p:cNvPr id="4" name="TextBox 3">
             <a:extLst>
               <a:ext uri="{FF2B5EF4-FFF2-40B4-BE49-F238E27FC236}">
-                <a16:creationId xmlns:a16="http://schemas.microsoft.com/office/drawing/2014/main" id="{66DBF8DD-5735-3EEC-EBF6-60A0247CF55B}"/>
-              </a:ext>
-            </a:extLst>
-          </p:cNvPr>
-          <p:cNvSpPr>
-            <a:spLocks noGrp="1"/>
-          </p:cNvSpPr>
-          <p:nvPr>
-            <p:ph type="sldNum" sz="quarter" idx="12"/>
-          </p:nvPr>
-        </p:nvSpPr>
-        <p:spPr/>
-        <p:txBody>
-          <a:bodyPr/>
-          <a:lstStyle/>
-          <a:p>
-            <a:fld id="{A1F22A05-E042-4B7F-81D6-ACE60F87E97E}" type="slidenum">
-              <a:rPr lang="en-GB" smtClean="0"/>
-              <a:t>15</a:t>
-            </a:fld>
-            <a:endParaRPr lang="en-GB"/>
-          </a:p>
-        </p:txBody>
-      </p:sp>
-      <p:sp>
-        <p:nvSpPr>
-          <p:cNvPr id="2" name="TextBox 1">
-            <a:extLst>
-              <a:ext uri="{FF2B5EF4-FFF2-40B4-BE49-F238E27FC236}">
-                <a16:creationId xmlns:a16="http://schemas.microsoft.com/office/drawing/2014/main" id="{B2494CE2-9DE7-FE21-CBE5-4334B1FC46B6}"/>
+                <a16:creationId xmlns:a16="http://schemas.microsoft.com/office/drawing/2014/main" id="{E4BCF081-88E3-82A9-6840-FBD446C26294}"/>
               </a:ext>
             </a:extLst>
           </p:cNvPr>
@@ -17958,8 +19079,8 @@
         </p:nvSpPr>
         <p:spPr>
           <a:xfrm>
-            <a:off x="754144" y="169682"/>
-            <a:ext cx="11594969" cy="646331"/>
+            <a:off x="1005840" y="1417320"/>
+            <a:ext cx="8723376" cy="1754326"/>
           </a:xfrm>
           <a:prstGeom prst="rect">
             <a:avLst/>
@@ -17973,23 +19094,64 @@
           <a:lstStyle/>
           <a:p>
             <a:r>
-              <a:rPr lang="en-GB" dirty="0"/>
-              <a:t>Introduction                II. Data cleaning                   IV. First models application        VI. Features selection</a:t>
+              <a:rPr lang="en-US" dirty="0"/>
+              <a:t>What’s next:</a:t>
             </a:r>
           </a:p>
           <a:p>
             <a:r>
-              <a:rPr lang="en-GB" dirty="0"/>
-              <a:t>I. Data description     III. Data preprocessing        V. Grid search application          </a:t>
+              <a:rPr lang="en-US" dirty="0"/>
+              <a:t>- Remove unnecessary parameters to improve the grid search functionality</a:t>
+            </a:r>
+          </a:p>
+          <a:p>
+            <a:pPr marL="285750" indent="-285750">
+              <a:buFontTx/>
+              <a:buChar char="-"/>
+            </a:pPr>
+            <a:r>
+              <a:rPr lang="en-US" dirty="0"/>
+              <a:t>Improve model functionality through (</a:t>
             </a:r>
             <a:r>
-              <a:rPr lang="en-GB" dirty="0">
-                <a:solidFill>
-                  <a:srgbClr val="FF0000"/>
-                </a:solidFill>
-              </a:rPr>
-              <a:t>Conclusion</a:t>
+              <a:rPr lang="en-US" dirty="0" err="1"/>
+              <a:t>max_iter</a:t>
             </a:r>
+            <a:r>
+              <a:rPr lang="en-US" dirty="0"/>
+              <a:t>, )</a:t>
+            </a:r>
+          </a:p>
+          <a:p>
+            <a:pPr marL="285750" indent="-285750">
+              <a:buFontTx/>
+              <a:buChar char="-"/>
+            </a:pPr>
+            <a:r>
+              <a:rPr lang="en-US" dirty="0"/>
+              <a:t>Retrieve more data as 600 is no where near enough</a:t>
+            </a:r>
+          </a:p>
+          <a:p>
+            <a:pPr marL="285750" indent="-285750">
+              <a:buFontTx/>
+              <a:buChar char="-"/>
+            </a:pPr>
+            <a:r>
+              <a:rPr lang="en-US" dirty="0"/>
+              <a:t>There could be more features that aren’t accounted for in </a:t>
+            </a:r>
+            <a:r>
+              <a:rPr lang="en-US"/>
+              <a:t>this dataset</a:t>
+            </a:r>
+          </a:p>
+          <a:p>
+            <a:pPr marL="285750" indent="-285750">
+              <a:buFontTx/>
+              <a:buChar char="-"/>
+            </a:pPr>
+            <a:endParaRPr lang="en-CA" dirty="0"/>
           </a:p>
         </p:txBody>
       </p:sp>

</xml_diff>